<commit_message>
Rapport COO3, ppt oral
</commit_message>
<xml_diff>
--- a/Documentation/PROJET DEVELOPPEMENT.pptx
+++ b/Documentation/PROJET DEVELOPPEMENT.pptx
@@ -5,10 +5,10 @@
     <p:sldMasterId id="2147483689" r:id="rId4"/>
   </p:sldMasterIdLst>
   <p:notesMasterIdLst>
-    <p:notesMasterId r:id="rId14"/>
+    <p:notesMasterId r:id="rId20"/>
   </p:notesMasterIdLst>
   <p:handoutMasterIdLst>
-    <p:handoutMasterId r:id="rId15"/>
+    <p:handoutMasterId r:id="rId21"/>
   </p:handoutMasterIdLst>
   <p:sldIdLst>
     <p:sldId id="265" r:id="rId5"/>
@@ -18,13 +18,19 @@
     <p:sldId id="268" r:id="rId9"/>
     <p:sldId id="269" r:id="rId10"/>
     <p:sldId id="273" r:id="rId11"/>
-    <p:sldId id="270" r:id="rId12"/>
-    <p:sldId id="271" r:id="rId13"/>
+    <p:sldId id="274" r:id="rId12"/>
+    <p:sldId id="280" r:id="rId13"/>
+    <p:sldId id="275" r:id="rId14"/>
+    <p:sldId id="277" r:id="rId15"/>
+    <p:sldId id="278" r:id="rId16"/>
+    <p:sldId id="279" r:id="rId17"/>
+    <p:sldId id="270" r:id="rId18"/>
+    <p:sldId id="281" r:id="rId19"/>
   </p:sldIdLst>
   <p:sldSz cx="12188825" cy="6858000"/>
   <p:notesSz cx="6858000" cy="9144000"/>
   <p:custDataLst>
-    <p:tags r:id="rId16"/>
+    <p:tags r:id="rId22"/>
   </p:custDataLst>
   <p:defaultTextStyle>
     <a:defPPr>
@@ -227,7 +233,7 @@
             <a:pPr algn="r" rtl="0"/>
             <a:fld id="{4FD0811F-65A0-45DC-A418-D7D88257DA14}" type="datetime1">
               <a:rPr lang="fr-FR" smtClean="0"/>
-              <a:t>28/04/2019</a:t>
+              <a:t>29/04/2019</a:t>
             </a:fld>
             <a:endParaRPr lang="fr-FR" dirty="0"/>
           </a:p>
@@ -397,7 +403,7 @@
             <a:fld id="{869BCCB5-3197-42F0-A23E-FBF35BB6BD6D}" type="datetime1">
               <a:rPr lang="fr-FR" smtClean="0"/>
               <a:pPr/>
-              <a:t>28/04/2019</a:t>
+              <a:t>29/04/2019</a:t>
             </a:fld>
             <a:endParaRPr lang="fr-FR" dirty="0"/>
           </a:p>
@@ -800,7 +806,7 @@
           <a:p>
             <a:fld id="{2100B30A-FF23-4815-81AC-088903D50D99}" type="datetimeFigureOut">
               <a:rPr lang="fr-FR" smtClean="0"/>
-              <a:t>28/04/2019</a:t>
+              <a:t>29/04/2019</a:t>
             </a:fld>
             <a:endParaRPr lang="fr-FR"/>
           </a:p>
@@ -1100,7 +1106,7 @@
             <a:fld id="{B1406553-4B01-4903-B663-70E503E45D52}" type="datetime1">
               <a:rPr lang="fr-FR" smtClean="0"/>
               <a:pPr/>
-              <a:t>28/04/2019</a:t>
+              <a:t>29/04/2019</a:t>
             </a:fld>
             <a:endParaRPr lang="fr-FR" dirty="0"/>
           </a:p>
@@ -1295,7 +1301,7 @@
             <a:fld id="{B1406553-4B01-4903-B663-70E503E45D52}" type="datetime1">
               <a:rPr lang="fr-FR" smtClean="0"/>
               <a:pPr/>
-              <a:t>28/04/2019</a:t>
+              <a:t>29/04/2019</a:t>
             </a:fld>
             <a:endParaRPr lang="fr-FR" dirty="0"/>
           </a:p>
@@ -1559,7 +1565,7 @@
             <a:fld id="{B1406553-4B01-4903-B663-70E503E45D52}" type="datetime1">
               <a:rPr lang="fr-FR" smtClean="0"/>
               <a:pPr/>
-              <a:t>28/04/2019</a:t>
+              <a:t>29/04/2019</a:t>
             </a:fld>
             <a:endParaRPr lang="fr-FR" dirty="0"/>
           </a:p>
@@ -1986,7 +1992,7 @@
             <a:fld id="{B1406553-4B01-4903-B663-70E503E45D52}" type="datetime1">
               <a:rPr lang="fr-FR" smtClean="0"/>
               <a:pPr/>
-              <a:t>28/04/2019</a:t>
+              <a:t>29/04/2019</a:t>
             </a:fld>
             <a:endParaRPr lang="fr-FR" dirty="0"/>
           </a:p>
@@ -2535,7 +2541,7 @@
             <a:fld id="{B1406553-4B01-4903-B663-70E503E45D52}" type="datetime1">
               <a:rPr lang="fr-FR" smtClean="0"/>
               <a:pPr/>
-              <a:t>28/04/2019</a:t>
+              <a:t>29/04/2019</a:t>
             </a:fld>
             <a:endParaRPr lang="fr-FR" dirty="0"/>
           </a:p>
@@ -3378,7 +3384,7 @@
             <a:fld id="{B1406553-4B01-4903-B663-70E503E45D52}" type="datetime1">
               <a:rPr lang="fr-FR" smtClean="0"/>
               <a:pPr/>
-              <a:t>28/04/2019</a:t>
+              <a:t>29/04/2019</a:t>
             </a:fld>
             <a:endParaRPr lang="fr-FR" dirty="0"/>
           </a:p>
@@ -3551,7 +3557,7 @@
             <a:fld id="{C169FE22-A35D-4AA5-9ED0-CA5AA0D08EE7}" type="datetime1">
               <a:rPr lang="fr-FR" smtClean="0"/>
               <a:pPr/>
-              <a:t>28/04/2019</a:t>
+              <a:t>29/04/2019</a:t>
             </a:fld>
             <a:endParaRPr lang="fr-FR" dirty="0"/>
           </a:p>
@@ -3750,7 +3756,7 @@
             <a:fld id="{4B2D50EC-F18A-4356-A82F-ED015F56C2C6}" type="datetime1">
               <a:rPr lang="fr-FR" smtClean="0"/>
               <a:pPr/>
-              <a:t>28/04/2019</a:t>
+              <a:t>29/04/2019</a:t>
             </a:fld>
             <a:endParaRPr lang="fr-FR" dirty="0"/>
           </a:p>
@@ -3935,7 +3941,7 @@
             <a:fld id="{D8AB5196-52B1-4918-B153-34A0C9A4A7AD}" type="datetime1">
               <a:rPr lang="fr-FR" smtClean="0"/>
               <a:pPr/>
-              <a:t>28/04/2019</a:t>
+              <a:t>29/04/2019</a:t>
             </a:fld>
             <a:endParaRPr lang="fr-FR" dirty="0"/>
           </a:p>
@@ -4198,7 +4204,7 @@
             <a:fld id="{B1406553-4B01-4903-B663-70E503E45D52}" type="datetime1">
               <a:rPr lang="fr-FR" smtClean="0"/>
               <a:pPr/>
-              <a:t>28/04/2019</a:t>
+              <a:t>29/04/2019</a:t>
             </a:fld>
             <a:endParaRPr lang="fr-FR" dirty="0"/>
           </a:p>
@@ -4438,7 +4444,7 @@
             <a:fld id="{3817870C-A0A5-4D92-B86D-C2791EFA3A23}" type="datetime1">
               <a:rPr lang="fr-FR" smtClean="0"/>
               <a:pPr/>
-              <a:t>28/04/2019</a:t>
+              <a:t>29/04/2019</a:t>
             </a:fld>
             <a:endParaRPr lang="fr-FR" dirty="0"/>
           </a:p>
@@ -4826,7 +4832,7 @@
             <a:fld id="{812A7B89-83CE-4355-8D19-9AD5D8179E27}" type="datetime1">
               <a:rPr lang="fr-FR" smtClean="0"/>
               <a:pPr/>
-              <a:t>28/04/2019</a:t>
+              <a:t>29/04/2019</a:t>
             </a:fld>
             <a:endParaRPr lang="fr-FR" dirty="0"/>
           </a:p>
@@ -4959,7 +4965,7 @@
             <a:fld id="{B1406553-4B01-4903-B663-70E503E45D52}" type="datetime1">
               <a:rPr lang="fr-FR" smtClean="0"/>
               <a:pPr/>
-              <a:t>28/04/2019</a:t>
+              <a:t>29/04/2019</a:t>
             </a:fld>
             <a:endParaRPr lang="fr-FR" dirty="0"/>
           </a:p>
@@ -5057,7 +5063,7 @@
             <a:fld id="{88F3045D-8AE6-4E47-932F-47FA387FEA34}" type="datetime1">
               <a:rPr lang="fr-FR" smtClean="0"/>
               <a:pPr/>
-              <a:t>28/04/2019</a:t>
+              <a:t>29/04/2019</a:t>
             </a:fld>
             <a:endParaRPr lang="fr-FR" dirty="0"/>
           </a:p>
@@ -5323,7 +5329,7 @@
             <a:fld id="{2282C9DA-93FE-4DDE-8920-2C8AB1F5E18A}" type="datetime1">
               <a:rPr lang="fr-FR" smtClean="0"/>
               <a:pPr/>
-              <a:t>28/04/2019</a:t>
+              <a:t>29/04/2019</a:t>
             </a:fld>
             <a:endParaRPr lang="fr-FR" dirty="0"/>
           </a:p>
@@ -5625,7 +5631,7 @@
             <a:fld id="{EB002A6A-F78C-474F-BA6B-17AE42EC613D}" type="datetime1">
               <a:rPr lang="fr-FR" smtClean="0"/>
               <a:pPr/>
-              <a:t>28/04/2019</a:t>
+              <a:t>29/04/2019</a:t>
             </a:fld>
             <a:endParaRPr lang="fr-FR" dirty="0"/>
           </a:p>
@@ -5854,7 +5860,7 @@
             <a:fld id="{B1406553-4B01-4903-B663-70E503E45D52}" type="datetime1">
               <a:rPr lang="fr-FR" smtClean="0"/>
               <a:pPr/>
-              <a:t>28/04/2019</a:t>
+              <a:t>29/04/2019</a:t>
             </a:fld>
             <a:endParaRPr lang="fr-FR" dirty="0"/>
           </a:p>
@@ -6754,6 +6760,736 @@
 </p:sld>
 </file>
 
+<file path=ppt/slides/slide10.xml><?xml version="1.0" encoding="utf-8"?>
+<p:sld xmlns:a="http://schemas.openxmlformats.org/drawingml/2006/main" xmlns:r="http://schemas.openxmlformats.org/officeDocument/2006/relationships" xmlns:p="http://schemas.openxmlformats.org/presentationml/2006/main">
+  <p:cSld>
+    <p:bg>
+      <p:bgPr>
+        <a:blipFill rotWithShape="1">
+          <a:blip r:embed="rId2">
+            <a:duotone>
+              <a:schemeClr val="bg2">
+                <a:shade val="18000"/>
+                <a:satMod val="160000"/>
+                <a:lumMod val="28000"/>
+              </a:schemeClr>
+              <a:schemeClr val="bg2">
+                <a:tint val="95000"/>
+                <a:satMod val="160000"/>
+                <a:lumMod val="116000"/>
+              </a:schemeClr>
+            </a:duotone>
+            <a:extLst/>
+          </a:blip>
+          <a:stretch/>
+        </a:blipFill>
+        <a:effectLst/>
+      </p:bgPr>
+    </p:bg>
+    <p:spTree>
+      <p:nvGrpSpPr>
+        <p:cNvPr id="1" name=""/>
+        <p:cNvGrpSpPr/>
+        <p:nvPr/>
+      </p:nvGrpSpPr>
+      <p:grpSpPr>
+        <a:xfrm>
+          <a:off x="0" y="0"/>
+          <a:ext cx="0" cy="0"/>
+          <a:chOff x="0" y="0"/>
+          <a:chExt cx="0" cy="0"/>
+        </a:xfrm>
+      </p:grpSpPr>
+      <p:sp>
+        <p:nvSpPr>
+          <p:cNvPr id="2" name="Titre 1">
+            <a:extLst>
+              <a:ext uri="{FF2B5EF4-FFF2-40B4-BE49-F238E27FC236}">
+                <a16:creationId xmlns:a16="http://schemas.microsoft.com/office/drawing/2014/main" id="{5D960EC9-AB93-4AB5-A86C-F8141568C86A}"/>
+              </a:ext>
+            </a:extLst>
+          </p:cNvPr>
+          <p:cNvSpPr>
+            <a:spLocks noGrp="1"/>
+          </p:cNvSpPr>
+          <p:nvPr>
+            <p:ph type="title"/>
+          </p:nvPr>
+        </p:nvSpPr>
+        <p:spPr>
+          <a:xfrm>
+            <a:off x="405780" y="1700808"/>
+            <a:ext cx="5894855" cy="2387600"/>
+          </a:xfrm>
+        </p:spPr>
+        <p:txBody>
+          <a:bodyPr vert="horz" lIns="91440" tIns="45720" rIns="91440" bIns="45720" rtlCol="0" anchor="b">
+            <a:normAutofit/>
+          </a:bodyPr>
+          <a:lstStyle/>
+          <a:p>
+            <a:pPr defTabSz="914400"/>
+            <a:r>
+              <a:rPr lang="en-US" sz="4800" dirty="0"/>
+              <a:t>USE CASE COTE CLIENT</a:t>
+            </a:r>
+          </a:p>
+        </p:txBody>
+      </p:sp>
+      <p:pic>
+        <p:nvPicPr>
+          <p:cNvPr id="7" name="Image 3">
+            <a:extLst>
+              <a:ext uri="{FF2B5EF4-FFF2-40B4-BE49-F238E27FC236}">
+                <a16:creationId xmlns:a16="http://schemas.microsoft.com/office/drawing/2014/main" id="{79A94564-CD05-44CA-80E3-DA9A752DD6AB}"/>
+              </a:ext>
+            </a:extLst>
+          </p:cNvPr>
+          <p:cNvPicPr>
+            <a:picLocks noGrp="1"/>
+          </p:cNvPicPr>
+          <p:nvPr>
+            <p:ph idx="1"/>
+          </p:nvPr>
+        </p:nvPicPr>
+        <p:blipFill>
+          <a:blip r:embed="rId3">
+            <a:extLst>
+              <a:ext uri="{28A0092B-C50C-407E-A947-70E740481C1C}">
+                <a14:useLocalDpi xmlns:a14="http://schemas.microsoft.com/office/drawing/2010/main" val="0"/>
+              </a:ext>
+            </a:extLst>
+          </a:blip>
+          <a:stretch>
+            <a:fillRect/>
+          </a:stretch>
+        </p:blipFill>
+        <p:spPr>
+          <a:xfrm>
+            <a:off x="6958508" y="188640"/>
+            <a:ext cx="4968552" cy="6408712"/>
+          </a:xfrm>
+          <a:prstGeom prst="rect">
+            <a:avLst/>
+          </a:prstGeom>
+          <a:ln w="190500" cap="sq">
+            <a:solidFill>
+              <a:srgbClr val="FFFFFF"/>
+            </a:solidFill>
+            <a:miter lim="800000"/>
+          </a:ln>
+          <a:effectLst>
+            <a:outerShdw blurRad="54991" dist="17780" dir="5400000" algn="ctr" rotWithShape="0">
+              <a:schemeClr val="bg1">
+                <a:alpha val="40000"/>
+              </a:schemeClr>
+            </a:outerShdw>
+          </a:effectLst>
+          <a:scene3d>
+            <a:camera prst="orthographicFront"/>
+            <a:lightRig rig="twoPt" dir="t">
+              <a:rot lat="0" lon="0" rev="7200000"/>
+            </a:lightRig>
+          </a:scene3d>
+          <a:sp3d>
+            <a:bevelT w="25400" h="19050"/>
+          </a:sp3d>
+        </p:spPr>
+      </p:pic>
+    </p:spTree>
+    <p:extLst>
+      <p:ext uri="{BB962C8B-B14F-4D97-AF65-F5344CB8AC3E}">
+        <p14:creationId xmlns:p14="http://schemas.microsoft.com/office/powerpoint/2010/main" val="4209907706"/>
+      </p:ext>
+    </p:extLst>
+  </p:cSld>
+  <p:clrMapOvr>
+    <a:masterClrMapping/>
+  </p:clrMapOvr>
+  <mc:AlternateContent xmlns:mc="http://schemas.openxmlformats.org/markup-compatibility/2006" xmlns:p14="http://schemas.microsoft.com/office/powerpoint/2010/main">
+    <mc:Choice Requires="p14">
+      <p:transition spd="med" p14:dur="700">
+        <p:fade/>
+      </p:transition>
+    </mc:Choice>
+    <mc:Fallback xmlns="">
+      <p:transition spd="med">
+        <p:fade/>
+      </p:transition>
+    </mc:Fallback>
+  </mc:AlternateContent>
+</p:sld>
+</file>
+
+<file path=ppt/slides/slide11.xml><?xml version="1.0" encoding="utf-8"?>
+<p:sld xmlns:a="http://schemas.openxmlformats.org/drawingml/2006/main" xmlns:r="http://schemas.openxmlformats.org/officeDocument/2006/relationships" xmlns:p="http://schemas.openxmlformats.org/presentationml/2006/main">
+  <p:cSld>
+    <p:spTree>
+      <p:nvGrpSpPr>
+        <p:cNvPr id="1" name=""/>
+        <p:cNvGrpSpPr/>
+        <p:nvPr/>
+      </p:nvGrpSpPr>
+      <p:grpSpPr>
+        <a:xfrm>
+          <a:off x="0" y="0"/>
+          <a:ext cx="0" cy="0"/>
+          <a:chOff x="0" y="0"/>
+          <a:chExt cx="0" cy="0"/>
+        </a:xfrm>
+      </p:grpSpPr>
+      <p:sp>
+        <p:nvSpPr>
+          <p:cNvPr id="2" name="Titre 1">
+            <a:extLst>
+              <a:ext uri="{FF2B5EF4-FFF2-40B4-BE49-F238E27FC236}">
+                <a16:creationId xmlns:a16="http://schemas.microsoft.com/office/drawing/2014/main" id="{5D960EC9-AB93-4AB5-A86C-F8141568C86A}"/>
+              </a:ext>
+            </a:extLst>
+          </p:cNvPr>
+          <p:cNvSpPr>
+            <a:spLocks noGrp="1"/>
+          </p:cNvSpPr>
+          <p:nvPr>
+            <p:ph type="title"/>
+          </p:nvPr>
+        </p:nvSpPr>
+        <p:spPr>
+          <a:xfrm>
+            <a:off x="405780" y="1700808"/>
+            <a:ext cx="5894855" cy="2387600"/>
+          </a:xfrm>
+        </p:spPr>
+        <p:txBody>
+          <a:bodyPr vert="horz" lIns="91440" tIns="45720" rIns="91440" bIns="45720" rtlCol="0" anchor="b">
+            <a:normAutofit/>
+          </a:bodyPr>
+          <a:lstStyle/>
+          <a:p>
+            <a:pPr defTabSz="914400"/>
+            <a:r>
+              <a:rPr lang="en-US" sz="4800" dirty="0"/>
+              <a:t>USE CASE COTE </a:t>
+            </a:r>
+            <a:r>
+              <a:rPr lang="en-US" sz="4800" dirty="0" err="1"/>
+              <a:t>serveur</a:t>
+            </a:r>
+            <a:endParaRPr lang="en-US" sz="4800" dirty="0"/>
+          </a:p>
+        </p:txBody>
+      </p:sp>
+      <p:sp>
+        <p:nvSpPr>
+          <p:cNvPr id="4" name="Espace réservé du contenu 3">
+            <a:extLst>
+              <a:ext uri="{FF2B5EF4-FFF2-40B4-BE49-F238E27FC236}">
+                <a16:creationId xmlns:a16="http://schemas.microsoft.com/office/drawing/2014/main" id="{A4ABA6EF-727A-4964-9555-D146CF3076BD}"/>
+              </a:ext>
+            </a:extLst>
+          </p:cNvPr>
+          <p:cNvSpPr>
+            <a:spLocks noGrp="1"/>
+          </p:cNvSpPr>
+          <p:nvPr>
+            <p:ph idx="1"/>
+          </p:nvPr>
+        </p:nvSpPr>
+        <p:spPr/>
+        <p:txBody>
+          <a:bodyPr/>
+          <a:lstStyle/>
+          <a:p>
+            <a:endParaRPr lang="fr-FR"/>
+          </a:p>
+        </p:txBody>
+      </p:sp>
+      <p:pic>
+        <p:nvPicPr>
+          <p:cNvPr id="6" name="Image 5">
+            <a:extLst>
+              <a:ext uri="{FF2B5EF4-FFF2-40B4-BE49-F238E27FC236}">
+                <a16:creationId xmlns:a16="http://schemas.microsoft.com/office/drawing/2014/main" id="{0DA9016F-BF9C-4454-9203-31F75611F9D0}"/>
+              </a:ext>
+            </a:extLst>
+          </p:cNvPr>
+          <p:cNvPicPr/>
+          <p:nvPr/>
+        </p:nvPicPr>
+        <p:blipFill>
+          <a:blip r:embed="rId2">
+            <a:extLst>
+              <a:ext uri="{28A0092B-C50C-407E-A947-70E740481C1C}">
+                <a14:useLocalDpi xmlns:a14="http://schemas.microsoft.com/office/drawing/2010/main" val="0"/>
+              </a:ext>
+            </a:extLst>
+          </a:blip>
+          <a:stretch>
+            <a:fillRect/>
+          </a:stretch>
+        </p:blipFill>
+        <p:spPr>
+          <a:xfrm>
+            <a:off x="6302445" y="188640"/>
+            <a:ext cx="5629984" cy="6552728"/>
+          </a:xfrm>
+          <a:prstGeom prst="rect">
+            <a:avLst/>
+          </a:prstGeom>
+        </p:spPr>
+      </p:pic>
+    </p:spTree>
+    <p:extLst>
+      <p:ext uri="{BB962C8B-B14F-4D97-AF65-F5344CB8AC3E}">
+        <p14:creationId xmlns:p14="http://schemas.microsoft.com/office/powerpoint/2010/main" val="2260441950"/>
+      </p:ext>
+    </p:extLst>
+  </p:cSld>
+  <p:clrMapOvr>
+    <a:masterClrMapping/>
+  </p:clrMapOvr>
+  <mc:AlternateContent xmlns:mc="http://schemas.openxmlformats.org/markup-compatibility/2006" xmlns:p14="http://schemas.microsoft.com/office/powerpoint/2010/main">
+    <mc:Choice Requires="p14">
+      <p:transition spd="med" p14:dur="700">
+        <p:fade/>
+      </p:transition>
+    </mc:Choice>
+    <mc:Fallback xmlns="">
+      <p:transition spd="med">
+        <p:fade/>
+      </p:transition>
+    </mc:Fallback>
+  </mc:AlternateContent>
+</p:sld>
+</file>
+
+<file path=ppt/slides/slide12.xml><?xml version="1.0" encoding="utf-8"?>
+<p:sld xmlns:a="http://schemas.openxmlformats.org/drawingml/2006/main" xmlns:r="http://schemas.openxmlformats.org/officeDocument/2006/relationships" xmlns:p="http://schemas.openxmlformats.org/presentationml/2006/main">
+  <p:cSld>
+    <p:spTree>
+      <p:nvGrpSpPr>
+        <p:cNvPr id="1" name=""/>
+        <p:cNvGrpSpPr/>
+        <p:nvPr/>
+      </p:nvGrpSpPr>
+      <p:grpSpPr>
+        <a:xfrm>
+          <a:off x="0" y="0"/>
+          <a:ext cx="0" cy="0"/>
+          <a:chOff x="0" y="0"/>
+          <a:chExt cx="0" cy="0"/>
+        </a:xfrm>
+      </p:grpSpPr>
+      <p:sp>
+        <p:nvSpPr>
+          <p:cNvPr id="2" name="Titre 1">
+            <a:extLst>
+              <a:ext uri="{FF2B5EF4-FFF2-40B4-BE49-F238E27FC236}">
+                <a16:creationId xmlns:a16="http://schemas.microsoft.com/office/drawing/2014/main" id="{457B5AC9-793C-473F-9111-96DD3C13DC4A}"/>
+              </a:ext>
+            </a:extLst>
+          </p:cNvPr>
+          <p:cNvSpPr>
+            <a:spLocks noGrp="1"/>
+          </p:cNvSpPr>
+          <p:nvPr>
+            <p:ph type="title"/>
+          </p:nvPr>
+        </p:nvSpPr>
+        <p:spPr>
+          <a:xfrm>
+            <a:off x="913557" y="609601"/>
+            <a:ext cx="10351065" cy="1326321"/>
+          </a:xfrm>
+        </p:spPr>
+        <p:txBody>
+          <a:bodyPr/>
+          <a:lstStyle/>
+          <a:p>
+            <a:endParaRPr lang="fr-FR" dirty="0"/>
+          </a:p>
+        </p:txBody>
+      </p:sp>
+      <p:sp>
+        <p:nvSpPr>
+          <p:cNvPr id="3" name="Espace réservé du contenu 2">
+            <a:extLst>
+              <a:ext uri="{FF2B5EF4-FFF2-40B4-BE49-F238E27FC236}">
+                <a16:creationId xmlns:a16="http://schemas.microsoft.com/office/drawing/2014/main" id="{3F1F4F88-CC15-465A-B0B7-FF75E0ACBAD9}"/>
+              </a:ext>
+            </a:extLst>
+          </p:cNvPr>
+          <p:cNvSpPr>
+            <a:spLocks noGrp="1"/>
+          </p:cNvSpPr>
+          <p:nvPr>
+            <p:ph idx="1"/>
+          </p:nvPr>
+        </p:nvSpPr>
+        <p:spPr/>
+        <p:txBody>
+          <a:bodyPr/>
+          <a:lstStyle/>
+          <a:p>
+            <a:endParaRPr lang="fr-FR"/>
+          </a:p>
+        </p:txBody>
+      </p:sp>
+      <p:pic>
+        <p:nvPicPr>
+          <p:cNvPr id="5" name="Image 4">
+            <a:extLst>
+              <a:ext uri="{FF2B5EF4-FFF2-40B4-BE49-F238E27FC236}">
+                <a16:creationId xmlns:a16="http://schemas.microsoft.com/office/drawing/2014/main" id="{99A0797A-0726-4194-8138-4621A635D2B4}"/>
+              </a:ext>
+            </a:extLst>
+          </p:cNvPr>
+          <p:cNvPicPr>
+            <a:picLocks noChangeAspect="1"/>
+          </p:cNvPicPr>
+          <p:nvPr/>
+        </p:nvPicPr>
+        <p:blipFill>
+          <a:blip r:embed="rId2"/>
+          <a:stretch>
+            <a:fillRect/>
+          </a:stretch>
+        </p:blipFill>
+        <p:spPr>
+          <a:xfrm>
+            <a:off x="-1" y="-6053"/>
+            <a:ext cx="12188825" cy="6863431"/>
+          </a:xfrm>
+          <a:prstGeom prst="rect">
+            <a:avLst/>
+          </a:prstGeom>
+        </p:spPr>
+      </p:pic>
+    </p:spTree>
+    <p:extLst>
+      <p:ext uri="{BB962C8B-B14F-4D97-AF65-F5344CB8AC3E}">
+        <p14:creationId xmlns:p14="http://schemas.microsoft.com/office/powerpoint/2010/main" val="4116630598"/>
+      </p:ext>
+    </p:extLst>
+  </p:cSld>
+  <p:clrMapOvr>
+    <a:masterClrMapping/>
+  </p:clrMapOvr>
+  <mc:AlternateContent xmlns:mc="http://schemas.openxmlformats.org/markup-compatibility/2006" xmlns:p14="http://schemas.microsoft.com/office/powerpoint/2010/main">
+    <mc:Choice Requires="p14">
+      <p:transition spd="med" p14:dur="700">
+        <p:fade/>
+      </p:transition>
+    </mc:Choice>
+    <mc:Fallback xmlns="">
+      <p:transition spd="med">
+        <p:fade/>
+      </p:transition>
+    </mc:Fallback>
+  </mc:AlternateContent>
+</p:sld>
+</file>
+
+<file path=ppt/slides/slide13.xml><?xml version="1.0" encoding="utf-8"?>
+<p:sld xmlns:a="http://schemas.openxmlformats.org/drawingml/2006/main" xmlns:r="http://schemas.openxmlformats.org/officeDocument/2006/relationships" xmlns:p="http://schemas.openxmlformats.org/presentationml/2006/main">
+  <p:cSld>
+    <p:spTree>
+      <p:nvGrpSpPr>
+        <p:cNvPr id="1" name=""/>
+        <p:cNvGrpSpPr/>
+        <p:nvPr/>
+      </p:nvGrpSpPr>
+      <p:grpSpPr>
+        <a:xfrm>
+          <a:off x="0" y="0"/>
+          <a:ext cx="0" cy="0"/>
+          <a:chOff x="0" y="0"/>
+          <a:chExt cx="0" cy="0"/>
+        </a:xfrm>
+      </p:grpSpPr>
+      <p:sp>
+        <p:nvSpPr>
+          <p:cNvPr id="2" name="Titre 1">
+            <a:extLst>
+              <a:ext uri="{FF2B5EF4-FFF2-40B4-BE49-F238E27FC236}">
+                <a16:creationId xmlns:a16="http://schemas.microsoft.com/office/drawing/2014/main" id="{E2F5AA2B-37C9-4585-A00C-5A1539DBA806}"/>
+              </a:ext>
+            </a:extLst>
+          </p:cNvPr>
+          <p:cNvSpPr>
+            <a:spLocks noGrp="1"/>
+          </p:cNvSpPr>
+          <p:nvPr>
+            <p:ph type="title"/>
+          </p:nvPr>
+        </p:nvSpPr>
+        <p:spPr/>
+        <p:txBody>
+          <a:bodyPr/>
+          <a:lstStyle/>
+          <a:p>
+            <a:endParaRPr lang="fr-FR"/>
+          </a:p>
+        </p:txBody>
+      </p:sp>
+      <p:sp>
+        <p:nvSpPr>
+          <p:cNvPr id="3" name="Espace réservé du contenu 2">
+            <a:extLst>
+              <a:ext uri="{FF2B5EF4-FFF2-40B4-BE49-F238E27FC236}">
+                <a16:creationId xmlns:a16="http://schemas.microsoft.com/office/drawing/2014/main" id="{F15FE546-CD1E-4835-804B-578A220CCB34}"/>
+              </a:ext>
+            </a:extLst>
+          </p:cNvPr>
+          <p:cNvSpPr>
+            <a:spLocks noGrp="1"/>
+          </p:cNvSpPr>
+          <p:nvPr>
+            <p:ph idx="1"/>
+          </p:nvPr>
+        </p:nvSpPr>
+        <p:spPr/>
+        <p:txBody>
+          <a:bodyPr/>
+          <a:lstStyle/>
+          <a:p>
+            <a:endParaRPr lang="fr-FR"/>
+          </a:p>
+        </p:txBody>
+      </p:sp>
+      <p:pic>
+        <p:nvPicPr>
+          <p:cNvPr id="4" name="Image 3">
+            <a:extLst>
+              <a:ext uri="{FF2B5EF4-FFF2-40B4-BE49-F238E27FC236}">
+                <a16:creationId xmlns:a16="http://schemas.microsoft.com/office/drawing/2014/main" id="{976BE12D-20D6-4270-AFEA-340612017A7C}"/>
+              </a:ext>
+            </a:extLst>
+          </p:cNvPr>
+          <p:cNvPicPr/>
+          <p:nvPr/>
+        </p:nvPicPr>
+        <p:blipFill>
+          <a:blip r:embed="rId2"/>
+          <a:stretch>
+            <a:fillRect/>
+          </a:stretch>
+        </p:blipFill>
+        <p:spPr>
+          <a:xfrm>
+            <a:off x="-1" y="0"/>
+            <a:ext cx="12188825" cy="6858000"/>
+          </a:xfrm>
+          <a:prstGeom prst="rect">
+            <a:avLst/>
+          </a:prstGeom>
+        </p:spPr>
+      </p:pic>
+    </p:spTree>
+    <p:extLst>
+      <p:ext uri="{BB962C8B-B14F-4D97-AF65-F5344CB8AC3E}">
+        <p14:creationId xmlns:p14="http://schemas.microsoft.com/office/powerpoint/2010/main" val="351686456"/>
+      </p:ext>
+    </p:extLst>
+  </p:cSld>
+  <p:clrMapOvr>
+    <a:masterClrMapping/>
+  </p:clrMapOvr>
+  <mc:AlternateContent xmlns:mc="http://schemas.openxmlformats.org/markup-compatibility/2006" xmlns:p14="http://schemas.microsoft.com/office/powerpoint/2010/main">
+    <mc:Choice Requires="p14">
+      <p:transition spd="med" p14:dur="700">
+        <p:fade/>
+      </p:transition>
+    </mc:Choice>
+    <mc:Fallback xmlns="">
+      <p:transition spd="med">
+        <p:fade/>
+      </p:transition>
+    </mc:Fallback>
+  </mc:AlternateContent>
+</p:sld>
+</file>
+
+<file path=ppt/slides/slide14.xml><?xml version="1.0" encoding="utf-8"?>
+<p:sld xmlns:a="http://schemas.openxmlformats.org/drawingml/2006/main" xmlns:r="http://schemas.openxmlformats.org/officeDocument/2006/relationships" xmlns:p="http://schemas.openxmlformats.org/presentationml/2006/main">
+  <p:cSld>
+    <p:spTree>
+      <p:nvGrpSpPr>
+        <p:cNvPr id="1" name=""/>
+        <p:cNvGrpSpPr/>
+        <p:nvPr/>
+      </p:nvGrpSpPr>
+      <p:grpSpPr>
+        <a:xfrm>
+          <a:off x="0" y="0"/>
+          <a:ext cx="0" cy="0"/>
+          <a:chOff x="0" y="0"/>
+          <a:chExt cx="0" cy="0"/>
+        </a:xfrm>
+      </p:grpSpPr>
+      <p:sp>
+        <p:nvSpPr>
+          <p:cNvPr id="2" name="Titre 1">
+            <a:extLst>
+              <a:ext uri="{FF2B5EF4-FFF2-40B4-BE49-F238E27FC236}">
+                <a16:creationId xmlns:a16="http://schemas.microsoft.com/office/drawing/2014/main" id="{42929F75-A672-4D1F-B1BF-802E7B2BACF4}"/>
+              </a:ext>
+            </a:extLst>
+          </p:cNvPr>
+          <p:cNvSpPr>
+            <a:spLocks noGrp="1"/>
+          </p:cNvSpPr>
+          <p:nvPr>
+            <p:ph type="title"/>
+          </p:nvPr>
+        </p:nvSpPr>
+        <p:spPr>
+          <a:xfrm>
+            <a:off x="693812" y="2617311"/>
+            <a:ext cx="10351065" cy="1326321"/>
+          </a:xfrm>
+        </p:spPr>
+        <p:txBody>
+          <a:bodyPr>
+            <a:normAutofit/>
+          </a:bodyPr>
+          <a:lstStyle/>
+          <a:p>
+            <a:r>
+              <a:rPr lang="fr-FR" sz="6000" dirty="0" err="1"/>
+              <a:t>demo</a:t>
+            </a:r>
+            <a:endParaRPr lang="fr-FR" sz="6000" dirty="0"/>
+          </a:p>
+        </p:txBody>
+      </p:sp>
+    </p:spTree>
+    <p:extLst>
+      <p:ext uri="{BB962C8B-B14F-4D97-AF65-F5344CB8AC3E}">
+        <p14:creationId xmlns:p14="http://schemas.microsoft.com/office/powerpoint/2010/main" val="2190374891"/>
+      </p:ext>
+    </p:extLst>
+  </p:cSld>
+  <p:clrMapOvr>
+    <a:masterClrMapping/>
+  </p:clrMapOvr>
+  <mc:AlternateContent xmlns:mc="http://schemas.openxmlformats.org/markup-compatibility/2006" xmlns:p14="http://schemas.microsoft.com/office/powerpoint/2010/main">
+    <mc:Choice Requires="p14">
+      <p:transition spd="med" p14:dur="700">
+        <p:fade/>
+      </p:transition>
+    </mc:Choice>
+    <mc:Fallback xmlns="">
+      <p:transition spd="med">
+        <p:fade/>
+      </p:transition>
+    </mc:Fallback>
+  </mc:AlternateContent>
+</p:sld>
+</file>
+
+<file path=ppt/slides/slide15.xml><?xml version="1.0" encoding="utf-8"?>
+<p:sld xmlns:a="http://schemas.openxmlformats.org/drawingml/2006/main" xmlns:r="http://schemas.openxmlformats.org/officeDocument/2006/relationships" xmlns:p="http://schemas.openxmlformats.org/presentationml/2006/main">
+  <p:cSld>
+    <p:spTree>
+      <p:nvGrpSpPr>
+        <p:cNvPr id="1" name=""/>
+        <p:cNvGrpSpPr/>
+        <p:nvPr/>
+      </p:nvGrpSpPr>
+      <p:grpSpPr>
+        <a:xfrm>
+          <a:off x="0" y="0"/>
+          <a:ext cx="0" cy="0"/>
+          <a:chOff x="0" y="0"/>
+          <a:chExt cx="0" cy="0"/>
+        </a:xfrm>
+      </p:grpSpPr>
+      <p:sp>
+        <p:nvSpPr>
+          <p:cNvPr id="2" name="Titre 1">
+            <a:extLst>
+              <a:ext uri="{FF2B5EF4-FFF2-40B4-BE49-F238E27FC236}">
+                <a16:creationId xmlns:a16="http://schemas.microsoft.com/office/drawing/2014/main" id="{D2D430AA-DF52-4D5E-A608-289541FB7063}"/>
+              </a:ext>
+            </a:extLst>
+          </p:cNvPr>
+          <p:cNvSpPr>
+            <a:spLocks noGrp="1"/>
+          </p:cNvSpPr>
+          <p:nvPr>
+            <p:ph type="title"/>
+          </p:nvPr>
+        </p:nvSpPr>
+        <p:spPr>
+          <a:xfrm>
+            <a:off x="912961" y="2617311"/>
+            <a:ext cx="10351065" cy="1326321"/>
+          </a:xfrm>
+        </p:spPr>
+        <p:txBody>
+          <a:bodyPr>
+            <a:normAutofit fontScale="90000"/>
+          </a:bodyPr>
+          <a:lstStyle/>
+          <a:p>
+            <a:r>
+              <a:rPr lang="fr-FR" sz="5400" dirty="0"/>
+              <a:t>Merci de votre attention</a:t>
+            </a:r>
+          </a:p>
+        </p:txBody>
+      </p:sp>
+      <p:sp>
+        <p:nvSpPr>
+          <p:cNvPr id="3" name="Espace réservé du contenu 2">
+            <a:extLst>
+              <a:ext uri="{FF2B5EF4-FFF2-40B4-BE49-F238E27FC236}">
+                <a16:creationId xmlns:a16="http://schemas.microsoft.com/office/drawing/2014/main" id="{729C133A-180B-447E-A3EA-77012D1668E0}"/>
+              </a:ext>
+            </a:extLst>
+          </p:cNvPr>
+          <p:cNvSpPr>
+            <a:spLocks noGrp="1"/>
+          </p:cNvSpPr>
+          <p:nvPr>
+            <p:ph idx="1"/>
+          </p:nvPr>
+        </p:nvSpPr>
+        <p:spPr/>
+        <p:txBody>
+          <a:bodyPr/>
+          <a:lstStyle/>
+          <a:p>
+            <a:endParaRPr lang="fr-FR"/>
+          </a:p>
+        </p:txBody>
+      </p:sp>
+    </p:spTree>
+    <p:extLst>
+      <p:ext uri="{BB962C8B-B14F-4D97-AF65-F5344CB8AC3E}">
+        <p14:creationId xmlns:p14="http://schemas.microsoft.com/office/powerpoint/2010/main" val="1256284958"/>
+      </p:ext>
+    </p:extLst>
+  </p:cSld>
+  <p:clrMapOvr>
+    <a:masterClrMapping/>
+  </p:clrMapOvr>
+  <mc:AlternateContent xmlns:mc="http://schemas.openxmlformats.org/markup-compatibility/2006" xmlns:p14="http://schemas.microsoft.com/office/powerpoint/2010/main">
+    <mc:Choice Requires="p14">
+      <p:transition spd="med" p14:dur="700">
+        <p:fade/>
+      </p:transition>
+    </mc:Choice>
+    <mc:Fallback xmlns="">
+      <p:transition spd="med">
+        <p:fade/>
+      </p:transition>
+    </mc:Fallback>
+  </mc:AlternateContent>
+</p:sld>
+</file>
+
 <file path=ppt/slides/slide2.xml><?xml version="1.0" encoding="utf-8"?>
 <p:sld xmlns:a="http://schemas.openxmlformats.org/drawingml/2006/main" xmlns:r="http://schemas.openxmlformats.org/officeDocument/2006/relationships" xmlns:p="http://schemas.openxmlformats.org/presentationml/2006/main">
   <p:cSld>
@@ -7276,8 +8012,8 @@
         </p:nvSpPr>
         <p:spPr>
           <a:xfrm>
-            <a:off x="931664" y="1408413"/>
-            <a:ext cx="3240360" cy="5632311"/>
+            <a:off x="1269876" y="1628800"/>
+            <a:ext cx="3240360" cy="5016758"/>
           </a:xfrm>
           <a:prstGeom prst="rect">
             <a:avLst/>
@@ -7363,18 +8099,6 @@
               <a:t>Materiaux</a:t>
             </a:r>
             <a:endParaRPr lang="fr-FR" sz="2000" dirty="0"/>
-          </a:p>
-          <a:p>
-            <a:r>
-              <a:rPr lang="fr-FR" sz="2000" dirty="0"/>
-              <a:t>	-Participant</a:t>
-            </a:r>
-          </a:p>
-          <a:p>
-            <a:r>
-              <a:rPr lang="fr-FR" sz="2000" dirty="0"/>
-              <a:t>	-Partie</a:t>
-            </a:r>
           </a:p>
           <a:p>
             <a:r>
@@ -7433,8 +8157,8 @@
         </p:nvSpPr>
         <p:spPr>
           <a:xfrm>
-            <a:off x="6396622" y="2121854"/>
-            <a:ext cx="3240360" cy="646331"/>
+            <a:off x="6598468" y="1941369"/>
+            <a:ext cx="3240360" cy="954107"/>
           </a:xfrm>
           <a:prstGeom prst="rect">
             <a:avLst/>
@@ -7448,17 +8172,17 @@
           <a:lstStyle/>
           <a:p>
             <a:r>
-              <a:rPr lang="fr-FR" b="1" dirty="0"/>
+              <a:rPr lang="fr-FR" sz="2800" b="1" dirty="0"/>
               <a:t>LANCEUR</a:t>
             </a:r>
           </a:p>
           <a:p>
             <a:r>
-              <a:rPr lang="fr-FR" b="1" dirty="0"/>
+              <a:rPr lang="fr-FR" sz="2800" b="1" dirty="0"/>
               <a:t>	</a:t>
             </a:r>
             <a:r>
-              <a:rPr lang="fr-FR" dirty="0"/>
+              <a:rPr lang="fr-FR" sz="2800" dirty="0"/>
               <a:t>-Lanceur</a:t>
             </a:r>
           </a:p>
@@ -7478,8 +8202,8 @@
         </p:nvSpPr>
         <p:spPr>
           <a:xfrm>
-            <a:off x="6598468" y="3567689"/>
-            <a:ext cx="3240360" cy="646331"/>
+            <a:off x="6598549" y="3567689"/>
+            <a:ext cx="3240360" cy="1384995"/>
           </a:xfrm>
           <a:prstGeom prst="rect">
             <a:avLst/>
@@ -7493,17 +8217,23 @@
           <a:lstStyle/>
           <a:p>
             <a:r>
-              <a:rPr lang="fr-FR" b="1" dirty="0"/>
+              <a:rPr lang="fr-FR" sz="2800" b="1" dirty="0"/>
               <a:t>SERVEUR</a:t>
             </a:r>
           </a:p>
           <a:p>
             <a:r>
-              <a:rPr lang="fr-FR" b="1" dirty="0"/>
+              <a:rPr lang="fr-FR" sz="2800" dirty="0"/>
+              <a:t>	-Partie</a:t>
+            </a:r>
+          </a:p>
+          <a:p>
+            <a:r>
+              <a:rPr lang="fr-FR" sz="2800" b="1" dirty="0"/>
               <a:t>	</a:t>
             </a:r>
             <a:r>
-              <a:rPr lang="fr-FR" dirty="0"/>
+              <a:rPr lang="fr-FR" sz="2800" dirty="0"/>
               <a:t>-Serveur</a:t>
             </a:r>
           </a:p>
@@ -8469,7 +9199,7 @@
           <p:cNvPr id="2" name="Titre 1">
             <a:extLst>
               <a:ext uri="{FF2B5EF4-FFF2-40B4-BE49-F238E27FC236}">
-                <a16:creationId xmlns:a16="http://schemas.microsoft.com/office/drawing/2014/main" id="{42929F75-A672-4D1F-B1BF-802E7B2BACF4}"/>
+                <a16:creationId xmlns:a16="http://schemas.microsoft.com/office/drawing/2014/main" id="{86016686-3496-42DE-8706-BCF237036F60}"/>
               </a:ext>
             </a:extLst>
           </p:cNvPr>
@@ -8482,28 +9212,91 @@
         </p:nvSpPr>
         <p:spPr>
           <a:xfrm>
-            <a:off x="693812" y="2617311"/>
+            <a:off x="913557" y="609601"/>
             <a:ext cx="10351065" cy="1326321"/>
           </a:xfrm>
         </p:spPr>
         <p:txBody>
-          <a:bodyPr>
-            <a:normAutofit/>
-          </a:bodyPr>
+          <a:bodyPr/>
           <a:lstStyle/>
           <a:p>
-            <a:r>
-              <a:rPr lang="fr-FR" sz="6000" dirty="0" err="1"/>
-              <a:t>demo</a:t>
-            </a:r>
-            <a:endParaRPr lang="fr-FR" sz="6000" dirty="0"/>
-          </a:p>
-        </p:txBody>
-      </p:sp>
+            <a:endParaRPr lang="fr-FR"/>
+          </a:p>
+        </p:txBody>
+      </p:sp>
+      <p:sp>
+        <p:nvSpPr>
+          <p:cNvPr id="3" name="Espace réservé du contenu 2">
+            <a:extLst>
+              <a:ext uri="{FF2B5EF4-FFF2-40B4-BE49-F238E27FC236}">
+                <a16:creationId xmlns:a16="http://schemas.microsoft.com/office/drawing/2014/main" id="{3FBC8537-E05C-4620-B4D7-03C2E63EA474}"/>
+              </a:ext>
+            </a:extLst>
+          </p:cNvPr>
+          <p:cNvSpPr>
+            <a:spLocks noGrp="1"/>
+          </p:cNvSpPr>
+          <p:nvPr>
+            <p:ph idx="1"/>
+          </p:nvPr>
+        </p:nvSpPr>
+        <p:spPr>
+          <a:xfrm>
+            <a:off x="913557" y="2096064"/>
+            <a:ext cx="10351066" cy="3695136"/>
+          </a:xfrm>
+        </p:spPr>
+        <p:txBody>
+          <a:bodyPr/>
+          <a:lstStyle/>
+          <a:p>
+            <a:endParaRPr lang="fr-FR" dirty="0"/>
+          </a:p>
+        </p:txBody>
+      </p:sp>
+      <p:pic>
+        <p:nvPicPr>
+          <p:cNvPr id="4" name="Image 3">
+            <a:extLst>
+              <a:ext uri="{FF2B5EF4-FFF2-40B4-BE49-F238E27FC236}">
+                <a16:creationId xmlns:a16="http://schemas.microsoft.com/office/drawing/2014/main" id="{2159A1FE-8623-4C48-A3C5-A17320A20C14}"/>
+              </a:ext>
+            </a:extLst>
+          </p:cNvPr>
+          <p:cNvPicPr/>
+          <p:nvPr/>
+        </p:nvPicPr>
+        <p:blipFill>
+          <a:blip r:embed="rId2">
+            <a:extLst>
+              <a:ext uri="{28A0092B-C50C-407E-A947-70E740481C1C}">
+                <a14:useLocalDpi xmlns:a14="http://schemas.microsoft.com/office/drawing/2010/main" val="0"/>
+              </a:ext>
+            </a:extLst>
+          </a:blip>
+          <a:srcRect/>
+          <a:stretch>
+            <a:fillRect/>
+          </a:stretch>
+        </p:blipFill>
+        <p:spPr bwMode="auto">
+          <a:xfrm>
+            <a:off x="0" y="-25549"/>
+            <a:ext cx="12188825" cy="6881986"/>
+          </a:xfrm>
+          <a:prstGeom prst="rect">
+            <a:avLst/>
+          </a:prstGeom>
+          <a:noFill/>
+          <a:ln>
+            <a:noFill/>
+          </a:ln>
+        </p:spPr>
+      </p:pic>
     </p:spTree>
     <p:extLst>
       <p:ext uri="{BB962C8B-B14F-4D97-AF65-F5344CB8AC3E}">
-        <p14:creationId xmlns:p14="http://schemas.microsoft.com/office/powerpoint/2010/main" val="2190374891"/>
+        <p14:creationId xmlns:p14="http://schemas.microsoft.com/office/powerpoint/2010/main" val="1963610882"/>
       </p:ext>
     </p:extLst>
   </p:cSld>
@@ -8544,10 +9337,10 @@
       </p:grpSpPr>
       <p:sp>
         <p:nvSpPr>
-          <p:cNvPr id="2" name="Titre 1">
+          <p:cNvPr id="3" name="Espace réservé du contenu 2">
             <a:extLst>
               <a:ext uri="{FF2B5EF4-FFF2-40B4-BE49-F238E27FC236}">
-                <a16:creationId xmlns:a16="http://schemas.microsoft.com/office/drawing/2014/main" id="{13CFF102-8C78-4B05-A71F-811FEDA45F40}"/>
+                <a16:creationId xmlns:a16="http://schemas.microsoft.com/office/drawing/2014/main" id="{A4CB20C3-3BDA-49B2-B3CE-9B09C0FB9371}"/>
               </a:ext>
             </a:extLst>
           </p:cNvPr>
@@ -8555,7 +9348,7 @@
             <a:spLocks noGrp="1"/>
           </p:cNvSpPr>
           <p:nvPr>
-            <p:ph type="title"/>
+            <p:ph idx="1"/>
           </p:nvPr>
         </p:nvSpPr>
         <p:spPr/>
@@ -8563,324 +9356,69 @@
           <a:bodyPr/>
           <a:lstStyle/>
           <a:p>
-            <a:r>
-              <a:rPr lang="fr-FR" dirty="0"/>
-              <a:t>CONSIGNES</a:t>
-            </a:r>
-          </a:p>
-        </p:txBody>
-      </p:sp>
-      <p:sp>
-        <p:nvSpPr>
-          <p:cNvPr id="4" name="Espace réservé du contenu 2">
+            <a:endParaRPr lang="fr-FR"/>
+          </a:p>
+        </p:txBody>
+      </p:sp>
+      <p:sp>
+        <p:nvSpPr>
+          <p:cNvPr id="5" name="Titre 4">
             <a:extLst>
               <a:ext uri="{FF2B5EF4-FFF2-40B4-BE49-F238E27FC236}">
-                <a16:creationId xmlns:a16="http://schemas.microsoft.com/office/drawing/2014/main" id="{B5F27260-B265-4831-B19E-CB9D5E855B50}"/>
+                <a16:creationId xmlns:a16="http://schemas.microsoft.com/office/drawing/2014/main" id="{4CE937E3-19F0-4A91-BD16-158965CBE544}"/>
               </a:ext>
             </a:extLst>
           </p:cNvPr>
-          <p:cNvSpPr txBox="1">
-            <a:spLocks/>
-          </p:cNvSpPr>
+          <p:cNvSpPr>
+            <a:spLocks noGrp="1"/>
+          </p:cNvSpPr>
+          <p:nvPr>
+            <p:ph type="title"/>
+          </p:nvPr>
+        </p:nvSpPr>
+        <p:spPr/>
+        <p:txBody>
+          <a:bodyPr/>
+          <a:lstStyle/>
+          <a:p>
+            <a:endParaRPr lang="fr-FR"/>
+          </a:p>
+        </p:txBody>
+      </p:sp>
+      <p:pic>
+        <p:nvPicPr>
+          <p:cNvPr id="6" name="Image 5">
+            <a:extLst>
+              <a:ext uri="{FF2B5EF4-FFF2-40B4-BE49-F238E27FC236}">
+                <a16:creationId xmlns:a16="http://schemas.microsoft.com/office/drawing/2014/main" id="{E0042290-FF01-4237-BA5B-72C9B5AC9FA7}"/>
+              </a:ext>
+            </a:extLst>
+          </p:cNvPr>
+          <p:cNvPicPr>
+            <a:picLocks noChangeAspect="1"/>
+          </p:cNvPicPr>
           <p:nvPr/>
-        </p:nvSpPr>
+        </p:nvPicPr>
+        <p:blipFill>
+          <a:blip r:embed="rId2"/>
+          <a:stretch>
+            <a:fillRect/>
+          </a:stretch>
+        </p:blipFill>
         <p:spPr>
           <a:xfrm>
-            <a:off x="1065957" y="2248464"/>
-            <a:ext cx="10351066" cy="3695136"/>
+            <a:off x="-1" y="-3700"/>
+            <a:ext cx="12188825" cy="6858000"/>
           </a:xfrm>
           <a:prstGeom prst="rect">
             <a:avLst/>
           </a:prstGeom>
         </p:spPr>
-        <p:txBody>
-          <a:bodyPr vert="horz" lIns="91440" tIns="45720" rIns="91440" bIns="45720" rtlCol="0">
-            <a:normAutofit fontScale="92500"/>
-          </a:bodyPr>
-          <a:lstStyle>
-            <a:lvl1pPr marL="228531" indent="-228531" algn="l" defTabSz="914126" rtl="0" eaLnBrk="1" latinLnBrk="0" hangingPunct="1">
-              <a:lnSpc>
-                <a:spcPct val="120000"/>
-              </a:lnSpc>
-              <a:spcBef>
-                <a:spcPts val="1000"/>
-              </a:spcBef>
-              <a:buFont typeface="Arial" panose="020B0604020202020204" pitchFamily="34" charset="0"/>
-              <a:buChar char="•"/>
-              <a:defRPr sz="1999" kern="1200">
-                <a:solidFill>
-                  <a:schemeClr val="tx1"/>
-                </a:solidFill>
-                <a:effectLst>
-                  <a:outerShdw blurRad="50800" dist="38100" dir="2700000" algn="tl" rotWithShape="0">
-                    <a:srgbClr val="000000">
-                      <a:alpha val="48000"/>
-                    </a:srgbClr>
-                  </a:outerShdw>
-                </a:effectLst>
-                <a:latin typeface="+mn-lt"/>
-                <a:ea typeface="+mn-ea"/>
-                <a:cs typeface="+mn-cs"/>
-              </a:defRPr>
-            </a:lvl1pPr>
-            <a:lvl2pPr marL="685594" indent="-228531" algn="l" defTabSz="914126" rtl="0" eaLnBrk="1" latinLnBrk="0" hangingPunct="1">
-              <a:lnSpc>
-                <a:spcPct val="120000"/>
-              </a:lnSpc>
-              <a:spcBef>
-                <a:spcPts val="500"/>
-              </a:spcBef>
-              <a:buFont typeface="Arial" panose="020B0604020202020204" pitchFamily="34" charset="0"/>
-              <a:buChar char="•"/>
-              <a:defRPr sz="1799" kern="1200">
-                <a:solidFill>
-                  <a:schemeClr val="tx1"/>
-                </a:solidFill>
-                <a:effectLst>
-                  <a:outerShdw blurRad="50800" dist="38100" dir="2700000" algn="tl" rotWithShape="0">
-                    <a:srgbClr val="000000">
-                      <a:alpha val="48000"/>
-                    </a:srgbClr>
-                  </a:outerShdw>
-                </a:effectLst>
-                <a:latin typeface="+mn-lt"/>
-                <a:ea typeface="+mn-ea"/>
-                <a:cs typeface="+mn-cs"/>
-              </a:defRPr>
-            </a:lvl2pPr>
-            <a:lvl3pPr marL="1142657" indent="-228531" algn="l" defTabSz="914126" rtl="0" eaLnBrk="1" latinLnBrk="0" hangingPunct="1">
-              <a:lnSpc>
-                <a:spcPct val="120000"/>
-              </a:lnSpc>
-              <a:spcBef>
-                <a:spcPts val="500"/>
-              </a:spcBef>
-              <a:buFont typeface="Arial" panose="020B0604020202020204" pitchFamily="34" charset="0"/>
-              <a:buChar char="•"/>
-              <a:defRPr sz="1600" kern="1200">
-                <a:solidFill>
-                  <a:schemeClr val="tx1"/>
-                </a:solidFill>
-                <a:effectLst>
-                  <a:outerShdw blurRad="50800" dist="38100" dir="2700000" algn="tl" rotWithShape="0">
-                    <a:srgbClr val="000000">
-                      <a:alpha val="48000"/>
-                    </a:srgbClr>
-                  </a:outerShdw>
-                </a:effectLst>
-                <a:latin typeface="+mn-lt"/>
-                <a:ea typeface="+mn-ea"/>
-                <a:cs typeface="+mn-cs"/>
-              </a:defRPr>
-            </a:lvl3pPr>
-            <a:lvl4pPr marL="1599720" indent="-228531" algn="l" defTabSz="914126" rtl="0" eaLnBrk="1" latinLnBrk="0" hangingPunct="1">
-              <a:lnSpc>
-                <a:spcPct val="120000"/>
-              </a:lnSpc>
-              <a:spcBef>
-                <a:spcPts val="500"/>
-              </a:spcBef>
-              <a:buFont typeface="Arial" panose="020B0604020202020204" pitchFamily="34" charset="0"/>
-              <a:buChar char="•"/>
-              <a:defRPr sz="1400" kern="1200">
-                <a:solidFill>
-                  <a:schemeClr val="tx1"/>
-                </a:solidFill>
-                <a:effectLst>
-                  <a:outerShdw blurRad="50800" dist="38100" dir="2700000" algn="tl" rotWithShape="0">
-                    <a:srgbClr val="000000">
-                      <a:alpha val="48000"/>
-                    </a:srgbClr>
-                  </a:outerShdw>
-                </a:effectLst>
-                <a:latin typeface="+mn-lt"/>
-                <a:ea typeface="+mn-ea"/>
-                <a:cs typeface="+mn-cs"/>
-              </a:defRPr>
-            </a:lvl4pPr>
-            <a:lvl5pPr marL="2056783" indent="-228531" algn="l" defTabSz="914126" rtl="0" eaLnBrk="1" latinLnBrk="0" hangingPunct="1">
-              <a:lnSpc>
-                <a:spcPct val="120000"/>
-              </a:lnSpc>
-              <a:spcBef>
-                <a:spcPts val="500"/>
-              </a:spcBef>
-              <a:buFont typeface="Arial" panose="020B0604020202020204" pitchFamily="34" charset="0"/>
-              <a:buChar char="•"/>
-              <a:defRPr sz="1200" kern="1200">
-                <a:solidFill>
-                  <a:schemeClr val="tx1"/>
-                </a:solidFill>
-                <a:effectLst>
-                  <a:outerShdw blurRad="50800" dist="38100" dir="2700000" algn="tl" rotWithShape="0">
-                    <a:srgbClr val="000000">
-                      <a:alpha val="48000"/>
-                    </a:srgbClr>
-                  </a:outerShdw>
-                </a:effectLst>
-                <a:latin typeface="+mn-lt"/>
-                <a:ea typeface="+mn-ea"/>
-                <a:cs typeface="+mn-cs"/>
-              </a:defRPr>
-            </a:lvl5pPr>
-            <a:lvl6pPr marL="2513846" indent="-228531" algn="l" defTabSz="914126" rtl="0" eaLnBrk="1" latinLnBrk="0" hangingPunct="1">
-              <a:lnSpc>
-                <a:spcPct val="120000"/>
-              </a:lnSpc>
-              <a:spcBef>
-                <a:spcPts val="500"/>
-              </a:spcBef>
-              <a:buFont typeface="Arial" panose="020B0604020202020204" pitchFamily="34" charset="0"/>
-              <a:buChar char="•"/>
-              <a:defRPr sz="1200" kern="1200">
-                <a:solidFill>
-                  <a:schemeClr val="tx1"/>
-                </a:solidFill>
-                <a:effectLst>
-                  <a:outerShdw blurRad="50800" dist="38100" dir="2700000" algn="tl" rotWithShape="0">
-                    <a:srgbClr val="000000">
-                      <a:alpha val="48000"/>
-                    </a:srgbClr>
-                  </a:outerShdw>
-                </a:effectLst>
-                <a:latin typeface="+mn-lt"/>
-                <a:ea typeface="+mn-ea"/>
-                <a:cs typeface="+mn-cs"/>
-              </a:defRPr>
-            </a:lvl6pPr>
-            <a:lvl7pPr marL="2970908" indent="-228531" algn="l" defTabSz="914126" rtl="0" eaLnBrk="1" latinLnBrk="0" hangingPunct="1">
-              <a:lnSpc>
-                <a:spcPct val="120000"/>
-              </a:lnSpc>
-              <a:spcBef>
-                <a:spcPts val="500"/>
-              </a:spcBef>
-              <a:buFont typeface="Arial" panose="020B0604020202020204" pitchFamily="34" charset="0"/>
-              <a:buChar char="•"/>
-              <a:defRPr sz="1200" kern="1200">
-                <a:solidFill>
-                  <a:schemeClr val="tx1"/>
-                </a:solidFill>
-                <a:effectLst>
-                  <a:outerShdw blurRad="50800" dist="38100" dir="2700000" algn="tl" rotWithShape="0">
-                    <a:srgbClr val="000000">
-                      <a:alpha val="48000"/>
-                    </a:srgbClr>
-                  </a:outerShdw>
-                </a:effectLst>
-                <a:latin typeface="+mn-lt"/>
-                <a:ea typeface="+mn-ea"/>
-                <a:cs typeface="+mn-cs"/>
-              </a:defRPr>
-            </a:lvl7pPr>
-            <a:lvl8pPr marL="3427971" indent="-228531" algn="l" defTabSz="914126" rtl="0" eaLnBrk="1" latinLnBrk="0" hangingPunct="1">
-              <a:lnSpc>
-                <a:spcPct val="120000"/>
-              </a:lnSpc>
-              <a:spcBef>
-                <a:spcPts val="500"/>
-              </a:spcBef>
-              <a:buFont typeface="Arial" panose="020B0604020202020204" pitchFamily="34" charset="0"/>
-              <a:buChar char="•"/>
-              <a:defRPr sz="1200" kern="1200">
-                <a:solidFill>
-                  <a:schemeClr val="tx1"/>
-                </a:solidFill>
-                <a:effectLst>
-                  <a:outerShdw blurRad="50800" dist="38100" dir="2700000" algn="tl" rotWithShape="0">
-                    <a:srgbClr val="000000">
-                      <a:alpha val="48000"/>
-                    </a:srgbClr>
-                  </a:outerShdw>
-                </a:effectLst>
-                <a:latin typeface="+mn-lt"/>
-                <a:ea typeface="+mn-ea"/>
-                <a:cs typeface="+mn-cs"/>
-              </a:defRPr>
-            </a:lvl8pPr>
-            <a:lvl9pPr marL="3885034" indent="-228531" algn="l" defTabSz="914126" rtl="0" eaLnBrk="1" latinLnBrk="0" hangingPunct="1">
-              <a:lnSpc>
-                <a:spcPct val="120000"/>
-              </a:lnSpc>
-              <a:spcBef>
-                <a:spcPts val="500"/>
-              </a:spcBef>
-              <a:buFont typeface="Arial" panose="020B0604020202020204" pitchFamily="34" charset="0"/>
-              <a:buChar char="•"/>
-              <a:defRPr sz="1200" kern="1200">
-                <a:solidFill>
-                  <a:schemeClr val="tx1"/>
-                </a:solidFill>
-                <a:effectLst>
-                  <a:outerShdw blurRad="50800" dist="38100" dir="2700000" algn="tl" rotWithShape="0">
-                    <a:srgbClr val="000000">
-                      <a:alpha val="48000"/>
-                    </a:srgbClr>
-                  </a:outerShdw>
-                </a:effectLst>
-                <a:latin typeface="+mn-lt"/>
-                <a:ea typeface="+mn-ea"/>
-                <a:cs typeface="+mn-cs"/>
-              </a:defRPr>
-            </a:lvl9pPr>
-          </a:lstStyle>
-          <a:p>
-            <a:r>
-              <a:rPr lang="fr-FR" dirty="0">
-                <a:effectLst/>
-              </a:rPr>
-              <a:t>2.Fonctionnalités réalisées : bilan à gros grain de ce qui a été fait</a:t>
-            </a:r>
-          </a:p>
-          <a:p>
-            <a:r>
-              <a:rPr lang="fr-FR" dirty="0">
-                <a:effectLst/>
-              </a:rPr>
-              <a:t>3.Grands choix de conception, organisation du code (à détailler dans la partie COO)</a:t>
-            </a:r>
-          </a:p>
-          <a:p>
-            <a:r>
-              <a:rPr lang="fr-FR" dirty="0">
-                <a:effectLst/>
-              </a:rPr>
-              <a:t>4.Organisation des tests : comment sont testés les éléments de représentation du jeu, les éléments qui servent aux décision des robots, l'intelligence des robots.</a:t>
-            </a:r>
-          </a:p>
-          <a:p>
-            <a:r>
-              <a:rPr lang="fr-FR" dirty="0">
-                <a:effectLst/>
-              </a:rPr>
-              <a:t>5.Points forts et points faibles de votre implémentation (parties bien conçues et bien testées vs parties moins stables ou qui ont besoin d'amélioration)</a:t>
-            </a:r>
-          </a:p>
-          <a:p>
-            <a:r>
-              <a:rPr lang="fr-FR" dirty="0">
-                <a:effectLst/>
-              </a:rPr>
-              <a:t>6.Gestion du projet, problèmes rencontrés, différence entre jalons prévus et jalons effectifs</a:t>
-            </a:r>
-          </a:p>
-          <a:p>
-            <a:r>
-              <a:rPr lang="fr-FR" dirty="0">
-                <a:effectLst/>
-              </a:rPr>
-              <a:t>7.Démo (à placer quand vous voulez)</a:t>
-            </a:r>
-          </a:p>
-          <a:p>
-            <a:endParaRPr lang="fr-FR" dirty="0"/>
-          </a:p>
-        </p:txBody>
-      </p:sp>
+      </p:pic>
     </p:spTree>
     <p:extLst>
       <p:ext uri="{BB962C8B-B14F-4D97-AF65-F5344CB8AC3E}">
-        <p14:creationId xmlns:p14="http://schemas.microsoft.com/office/powerpoint/2010/main" val="2632287424"/>
+        <p14:creationId xmlns:p14="http://schemas.microsoft.com/office/powerpoint/2010/main" val="3119185157"/>
       </p:ext>
     </p:extLst>
   </p:cSld>
@@ -9677,6 +10215,133 @@
 </file>
 
 <file path=customXml/item1.xml><?xml version="1.0" encoding="utf-8"?>
+<p:properties xmlns:p="http://schemas.microsoft.com/office/2006/metadata/properties" xmlns:xsi="http://www.w3.org/2001/XMLSchema-instance" xmlns:pc="http://schemas.microsoft.com/office/infopath/2007/PartnerControls">
+  <documentManagement>
+    <DirectSourceMarket xmlns="4873beb7-5857-4685-be1f-d57550cc96cc" xsi:nil="true"/>
+    <ApprovalStatus xmlns="4873beb7-5857-4685-be1f-d57550cc96cc">InProgress</ApprovalStatus>
+    <MarketSpecific xmlns="4873beb7-5857-4685-be1f-d57550cc96cc">false</MarketSpecific>
+    <LocComments xmlns="4873beb7-5857-4685-be1f-d57550cc96cc" xsi:nil="true"/>
+    <ThumbnailAssetId xmlns="4873beb7-5857-4685-be1f-d57550cc96cc" xsi:nil="true"/>
+    <PrimaryImageGen xmlns="4873beb7-5857-4685-be1f-d57550cc96cc">true</PrimaryImageGen>
+    <LegacyData xmlns="4873beb7-5857-4685-be1f-d57550cc96cc" xsi:nil="true"/>
+    <LocRecommendedHandoff xmlns="4873beb7-5857-4685-be1f-d57550cc96cc" xsi:nil="true"/>
+    <BusinessGroup xmlns="4873beb7-5857-4685-be1f-d57550cc96cc" xsi:nil="true"/>
+    <BlockPublish xmlns="4873beb7-5857-4685-be1f-d57550cc96cc">false</BlockPublish>
+    <TPFriendlyName xmlns="4873beb7-5857-4685-be1f-d57550cc96cc" xsi:nil="true"/>
+    <NumericId xmlns="4873beb7-5857-4685-be1f-d57550cc96cc" xsi:nil="true"/>
+    <APEditor xmlns="4873beb7-5857-4685-be1f-d57550cc96cc">
+      <UserInfo>
+        <DisplayName/>
+        <AccountId xsi:nil="true"/>
+        <AccountType/>
+      </UserInfo>
+    </APEditor>
+    <SourceTitle xmlns="4873beb7-5857-4685-be1f-d57550cc96cc" xsi:nil="true"/>
+    <OpenTemplate xmlns="4873beb7-5857-4685-be1f-d57550cc96cc">true</OpenTemplate>
+    <UALocComments xmlns="4873beb7-5857-4685-be1f-d57550cc96cc" xsi:nil="true"/>
+    <ParentAssetId xmlns="4873beb7-5857-4685-be1f-d57550cc96cc" xsi:nil="true"/>
+    <IntlLangReviewDate xmlns="4873beb7-5857-4685-be1f-d57550cc96cc" xsi:nil="true"/>
+    <FeatureTagsTaxHTField0 xmlns="4873beb7-5857-4685-be1f-d57550cc96cc">
+      <Terms xmlns="http://schemas.microsoft.com/office/infopath/2007/PartnerControls"/>
+    </FeatureTagsTaxHTField0>
+    <PublishStatusLookup xmlns="4873beb7-5857-4685-be1f-d57550cc96cc">
+      <Value>1564227</Value>
+    </PublishStatusLookup>
+    <Providers xmlns="4873beb7-5857-4685-be1f-d57550cc96cc" xsi:nil="true"/>
+    <MachineTranslated xmlns="4873beb7-5857-4685-be1f-d57550cc96cc">false</MachineTranslated>
+    <OriginalSourceMarket xmlns="4873beb7-5857-4685-be1f-d57550cc96cc" xsi:nil="true"/>
+    <APDescription xmlns="4873beb7-5857-4685-be1f-d57550cc96cc">Take your audience through a digital tunnel where they'll  burst through to the other side and see the information you want to present. Show them lists, charts, tables, SmartArt,  and pictures using a variety of layouts in widescreen (16X9) format. This design works well for subjects on science and technology, computers, communication, and more.   
+</APDescription>
+    <ClipArtFilename xmlns="4873beb7-5857-4685-be1f-d57550cc96cc" xsi:nil="true"/>
+    <ContentItem xmlns="4873beb7-5857-4685-be1f-d57550cc96cc" xsi:nil="true"/>
+    <TPInstallLocation xmlns="4873beb7-5857-4685-be1f-d57550cc96cc" xsi:nil="true"/>
+    <PublishTargets xmlns="4873beb7-5857-4685-be1f-d57550cc96cc">OfficeOnlineVNext</PublishTargets>
+    <TimesCloned xmlns="4873beb7-5857-4685-be1f-d57550cc96cc" xsi:nil="true"/>
+    <AssetStart xmlns="4873beb7-5857-4685-be1f-d57550cc96cc">2012-05-11T02:04:00+00:00</AssetStart>
+    <Provider xmlns="4873beb7-5857-4685-be1f-d57550cc96cc" xsi:nil="true"/>
+    <AcquiredFrom xmlns="4873beb7-5857-4685-be1f-d57550cc96cc">Internal MS</AcquiredFrom>
+    <FriendlyTitle xmlns="4873beb7-5857-4685-be1f-d57550cc96cc" xsi:nil="true"/>
+    <LastHandOff xmlns="4873beb7-5857-4685-be1f-d57550cc96cc" xsi:nil="true"/>
+    <TPClientViewer xmlns="4873beb7-5857-4685-be1f-d57550cc96cc" xsi:nil="true"/>
+    <UACurrentWords xmlns="4873beb7-5857-4685-be1f-d57550cc96cc" xsi:nil="true"/>
+    <ArtSampleDocs xmlns="4873beb7-5857-4685-be1f-d57550cc96cc" xsi:nil="true"/>
+    <UALocRecommendation xmlns="4873beb7-5857-4685-be1f-d57550cc96cc">Localize</UALocRecommendation>
+    <Manager xmlns="4873beb7-5857-4685-be1f-d57550cc96cc" xsi:nil="true"/>
+    <ShowIn xmlns="4873beb7-5857-4685-be1f-d57550cc96cc">Show everywhere</ShowIn>
+    <UANotes xmlns="4873beb7-5857-4685-be1f-d57550cc96cc" xsi:nil="true"/>
+    <TemplateStatus xmlns="4873beb7-5857-4685-be1f-d57550cc96cc">Complete</TemplateStatus>
+    <InternalTagsTaxHTField0 xmlns="4873beb7-5857-4685-be1f-d57550cc96cc">
+      <Terms xmlns="http://schemas.microsoft.com/office/infopath/2007/PartnerControls"/>
+    </InternalTagsTaxHTField0>
+    <CSXHash xmlns="4873beb7-5857-4685-be1f-d57550cc96cc" xsi:nil="true"/>
+    <Downloads xmlns="4873beb7-5857-4685-be1f-d57550cc96cc">0</Downloads>
+    <VoteCount xmlns="4873beb7-5857-4685-be1f-d57550cc96cc" xsi:nil="true"/>
+    <OOCacheId xmlns="4873beb7-5857-4685-be1f-d57550cc96cc" xsi:nil="true"/>
+    <IsDeleted xmlns="4873beb7-5857-4685-be1f-d57550cc96cc">false</IsDeleted>
+    <AssetExpire xmlns="4873beb7-5857-4685-be1f-d57550cc96cc">2029-01-01T08:00:00+00:00</AssetExpire>
+    <DSATActionTaken xmlns="4873beb7-5857-4685-be1f-d57550cc96cc" xsi:nil="true"/>
+    <CSXSubmissionMarket xmlns="4873beb7-5857-4685-be1f-d57550cc96cc" xsi:nil="true"/>
+    <TPExecutable xmlns="4873beb7-5857-4685-be1f-d57550cc96cc" xsi:nil="true"/>
+    <SubmitterId xmlns="4873beb7-5857-4685-be1f-d57550cc96cc" xsi:nil="true"/>
+    <EditorialTags xmlns="4873beb7-5857-4685-be1f-d57550cc96cc" xsi:nil="true"/>
+    <ApprovalLog xmlns="4873beb7-5857-4685-be1f-d57550cc96cc" xsi:nil="true"/>
+    <AssetType xmlns="4873beb7-5857-4685-be1f-d57550cc96cc">TP</AssetType>
+    <BugNumber xmlns="4873beb7-5857-4685-be1f-d57550cc96cc" xsi:nil="true"/>
+    <CSXSubmissionDate xmlns="4873beb7-5857-4685-be1f-d57550cc96cc" xsi:nil="true"/>
+    <CSXUpdate xmlns="4873beb7-5857-4685-be1f-d57550cc96cc">false</CSXUpdate>
+    <Milestone xmlns="4873beb7-5857-4685-be1f-d57550cc96cc" xsi:nil="true"/>
+    <RecommendationsModifier xmlns="4873beb7-5857-4685-be1f-d57550cc96cc" xsi:nil="true"/>
+    <OriginAsset xmlns="4873beb7-5857-4685-be1f-d57550cc96cc" xsi:nil="true"/>
+    <TPComponent xmlns="4873beb7-5857-4685-be1f-d57550cc96cc" xsi:nil="true"/>
+    <AssetId xmlns="4873beb7-5857-4685-be1f-d57550cc96cc">TP102895246</AssetId>
+    <IntlLocPriority xmlns="4873beb7-5857-4685-be1f-d57550cc96cc" xsi:nil="true"/>
+    <PolicheckWords xmlns="4873beb7-5857-4685-be1f-d57550cc96cc" xsi:nil="true"/>
+    <TPLaunchHelpLink xmlns="4873beb7-5857-4685-be1f-d57550cc96cc" xsi:nil="true"/>
+    <TPApplication xmlns="4873beb7-5857-4685-be1f-d57550cc96cc" xsi:nil="true"/>
+    <CrawlForDependencies xmlns="4873beb7-5857-4685-be1f-d57550cc96cc">false</CrawlForDependencies>
+    <HandoffToMSDN xmlns="4873beb7-5857-4685-be1f-d57550cc96cc" xsi:nil="true"/>
+    <PlannedPubDate xmlns="4873beb7-5857-4685-be1f-d57550cc96cc" xsi:nil="true"/>
+    <IntlLangReviewer xmlns="4873beb7-5857-4685-be1f-d57550cc96cc" xsi:nil="true"/>
+    <TrustLevel xmlns="4873beb7-5857-4685-be1f-d57550cc96cc">1 Microsoft Managed Content</TrustLevel>
+    <LocLastLocAttemptVersionLookup xmlns="4873beb7-5857-4685-be1f-d57550cc96cc">835483</LocLastLocAttemptVersionLookup>
+    <IsSearchable xmlns="4873beb7-5857-4685-be1f-d57550cc96cc">true</IsSearchable>
+    <TemplateTemplateType xmlns="4873beb7-5857-4685-be1f-d57550cc96cc">PowerPoint Presentation Template</TemplateTemplateType>
+    <CampaignTagsTaxHTField0 xmlns="4873beb7-5857-4685-be1f-d57550cc96cc">
+      <Terms xmlns="http://schemas.microsoft.com/office/infopath/2007/PartnerControls"/>
+    </CampaignTagsTaxHTField0>
+    <TPNamespace xmlns="4873beb7-5857-4685-be1f-d57550cc96cc" xsi:nil="true"/>
+    <TaxCatchAll xmlns="4873beb7-5857-4685-be1f-d57550cc96cc"/>
+    <Markets xmlns="4873beb7-5857-4685-be1f-d57550cc96cc"/>
+    <UAProjectedTotalWords xmlns="4873beb7-5857-4685-be1f-d57550cc96cc" xsi:nil="true"/>
+    <IntlLangReview xmlns="4873beb7-5857-4685-be1f-d57550cc96cc">false</IntlLangReview>
+    <OutputCachingOn xmlns="4873beb7-5857-4685-be1f-d57550cc96cc">false</OutputCachingOn>
+    <AverageRating xmlns="4873beb7-5857-4685-be1f-d57550cc96cc" xsi:nil="true"/>
+    <APAuthor xmlns="4873beb7-5857-4685-be1f-d57550cc96cc">
+      <UserInfo>
+        <DisplayName>REDMOND\v-vaddu</DisplayName>
+        <AccountId>2567</AccountId>
+        <AccountType/>
+      </UserInfo>
+    </APAuthor>
+    <LocManualTestRequired xmlns="4873beb7-5857-4685-be1f-d57550cc96cc">false</LocManualTestRequired>
+    <TPCommandLine xmlns="4873beb7-5857-4685-be1f-d57550cc96cc" xsi:nil="true"/>
+    <TPAppVersion xmlns="4873beb7-5857-4685-be1f-d57550cc96cc" xsi:nil="true"/>
+    <EditorialStatus xmlns="4873beb7-5857-4685-be1f-d57550cc96cc">Complete</EditorialStatus>
+    <LastModifiedDateTime xmlns="4873beb7-5857-4685-be1f-d57550cc96cc" xsi:nil="true"/>
+    <ScenarioTagsTaxHTField0 xmlns="4873beb7-5857-4685-be1f-d57550cc96cc">
+      <Terms xmlns="http://schemas.microsoft.com/office/infopath/2007/PartnerControls"/>
+    </ScenarioTagsTaxHTField0>
+    <OriginalRelease xmlns="4873beb7-5857-4685-be1f-d57550cc96cc">15</OriginalRelease>
+    <TPLaunchHelpLinkType xmlns="4873beb7-5857-4685-be1f-d57550cc96cc">Template</TPLaunchHelpLinkType>
+    <LocalizationTagsTaxHTField0 xmlns="4873beb7-5857-4685-be1f-d57550cc96cc">
+      <Terms xmlns="http://schemas.microsoft.com/office/infopath/2007/PartnerControls"/>
+    </LocalizationTagsTaxHTField0>
+    <LocMarketGroupTiers2 xmlns="4873beb7-5857-4685-be1f-d57550cc96cc" xsi:nil="true"/>
+  </documentManagement>
+</p:properties>
+</file>
+
+<file path=customXml/item2.xml><?xml version="1.0" encoding="utf-8"?>
 <ct:contentTypeSchema xmlns:ct="http://schemas.microsoft.com/office/2006/metadata/contentType" xmlns:ma="http://schemas.microsoft.com/office/2006/metadata/properties/metaAttributes" ct:_="" ma:_="" ma:contentTypeName="TemplateFile" ma:contentTypeID="0x0101006EDDDB5EE6D98C44930B742096920B300400F5B6D36B3EF94B4E9A635CDF2A18F5B8" ma:contentTypeVersion="72" ma:contentTypeDescription="Create a new document." ma:contentTypeScope="" ma:versionID="a23e56308344d904b51738559c3d67c9">
   <xsd:schema xmlns:xsd="http://www.w3.org/2001/XMLSchema" xmlns:xs="http://www.w3.org/2001/XMLSchema" xmlns:p="http://schemas.microsoft.com/office/2006/metadata/properties" xmlns:ns2="4873beb7-5857-4685-be1f-d57550cc96cc" targetNamespace="http://schemas.microsoft.com/office/2006/metadata/properties" ma:root="true" ma:fieldsID="cd0908cc4600e77bf5da051303e00c8d" ns2:_="">
     <xsd:import namespace="4873beb7-5857-4685-be1f-d57550cc96cc"/>
@@ -10716,7 +11381,7 @@
 </ct:contentTypeSchema>
 </file>
 
-<file path=customXml/item2.xml><?xml version="1.0" encoding="utf-8"?>
+<file path=customXml/item3.xml><?xml version="1.0" encoding="utf-8"?>
 <?mso-contentType ?>
 <FormTemplates xmlns="http://schemas.microsoft.com/sharepoint/v3/contenttype/forms">
   <Display>DocumentLibraryForm</Display>
@@ -10725,134 +11390,23 @@
 </FormTemplates>
 </file>
 
-<file path=customXml/item3.xml><?xml version="1.0" encoding="utf-8"?>
-<p:properties xmlns:p="http://schemas.microsoft.com/office/2006/metadata/properties" xmlns:xsi="http://www.w3.org/2001/XMLSchema-instance" xmlns:pc="http://schemas.microsoft.com/office/infopath/2007/PartnerControls">
-  <documentManagement>
-    <DirectSourceMarket xmlns="4873beb7-5857-4685-be1f-d57550cc96cc" xsi:nil="true"/>
-    <ApprovalStatus xmlns="4873beb7-5857-4685-be1f-d57550cc96cc">InProgress</ApprovalStatus>
-    <MarketSpecific xmlns="4873beb7-5857-4685-be1f-d57550cc96cc">false</MarketSpecific>
-    <LocComments xmlns="4873beb7-5857-4685-be1f-d57550cc96cc" xsi:nil="true"/>
-    <ThumbnailAssetId xmlns="4873beb7-5857-4685-be1f-d57550cc96cc" xsi:nil="true"/>
-    <PrimaryImageGen xmlns="4873beb7-5857-4685-be1f-d57550cc96cc">true</PrimaryImageGen>
-    <LegacyData xmlns="4873beb7-5857-4685-be1f-d57550cc96cc" xsi:nil="true"/>
-    <LocRecommendedHandoff xmlns="4873beb7-5857-4685-be1f-d57550cc96cc" xsi:nil="true"/>
-    <BusinessGroup xmlns="4873beb7-5857-4685-be1f-d57550cc96cc" xsi:nil="true"/>
-    <BlockPublish xmlns="4873beb7-5857-4685-be1f-d57550cc96cc">false</BlockPublish>
-    <TPFriendlyName xmlns="4873beb7-5857-4685-be1f-d57550cc96cc" xsi:nil="true"/>
-    <NumericId xmlns="4873beb7-5857-4685-be1f-d57550cc96cc" xsi:nil="true"/>
-    <APEditor xmlns="4873beb7-5857-4685-be1f-d57550cc96cc">
-      <UserInfo>
-        <DisplayName/>
-        <AccountId xsi:nil="true"/>
-        <AccountType/>
-      </UserInfo>
-    </APEditor>
-    <SourceTitle xmlns="4873beb7-5857-4685-be1f-d57550cc96cc" xsi:nil="true"/>
-    <OpenTemplate xmlns="4873beb7-5857-4685-be1f-d57550cc96cc">true</OpenTemplate>
-    <UALocComments xmlns="4873beb7-5857-4685-be1f-d57550cc96cc" xsi:nil="true"/>
-    <ParentAssetId xmlns="4873beb7-5857-4685-be1f-d57550cc96cc" xsi:nil="true"/>
-    <IntlLangReviewDate xmlns="4873beb7-5857-4685-be1f-d57550cc96cc" xsi:nil="true"/>
-    <FeatureTagsTaxHTField0 xmlns="4873beb7-5857-4685-be1f-d57550cc96cc">
-      <Terms xmlns="http://schemas.microsoft.com/office/infopath/2007/PartnerControls"/>
-    </FeatureTagsTaxHTField0>
-    <PublishStatusLookup xmlns="4873beb7-5857-4685-be1f-d57550cc96cc">
-      <Value>1564227</Value>
-    </PublishStatusLookup>
-    <Providers xmlns="4873beb7-5857-4685-be1f-d57550cc96cc" xsi:nil="true"/>
-    <MachineTranslated xmlns="4873beb7-5857-4685-be1f-d57550cc96cc">false</MachineTranslated>
-    <OriginalSourceMarket xmlns="4873beb7-5857-4685-be1f-d57550cc96cc" xsi:nil="true"/>
-    <APDescription xmlns="4873beb7-5857-4685-be1f-d57550cc96cc">Take your audience through a digital tunnel where they'll  burst through to the other side and see the information you want to present. Show them lists, charts, tables, SmartArt,  and pictures using a variety of layouts in widescreen (16X9) format. This design works well for subjects on science and technology, computers, communication, and more.   
-</APDescription>
-    <ClipArtFilename xmlns="4873beb7-5857-4685-be1f-d57550cc96cc" xsi:nil="true"/>
-    <ContentItem xmlns="4873beb7-5857-4685-be1f-d57550cc96cc" xsi:nil="true"/>
-    <TPInstallLocation xmlns="4873beb7-5857-4685-be1f-d57550cc96cc" xsi:nil="true"/>
-    <PublishTargets xmlns="4873beb7-5857-4685-be1f-d57550cc96cc">OfficeOnlineVNext</PublishTargets>
-    <TimesCloned xmlns="4873beb7-5857-4685-be1f-d57550cc96cc" xsi:nil="true"/>
-    <AssetStart xmlns="4873beb7-5857-4685-be1f-d57550cc96cc">2012-05-11T02:04:00+00:00</AssetStart>
-    <Provider xmlns="4873beb7-5857-4685-be1f-d57550cc96cc" xsi:nil="true"/>
-    <AcquiredFrom xmlns="4873beb7-5857-4685-be1f-d57550cc96cc">Internal MS</AcquiredFrom>
-    <FriendlyTitle xmlns="4873beb7-5857-4685-be1f-d57550cc96cc" xsi:nil="true"/>
-    <LastHandOff xmlns="4873beb7-5857-4685-be1f-d57550cc96cc" xsi:nil="true"/>
-    <TPClientViewer xmlns="4873beb7-5857-4685-be1f-d57550cc96cc" xsi:nil="true"/>
-    <UACurrentWords xmlns="4873beb7-5857-4685-be1f-d57550cc96cc" xsi:nil="true"/>
-    <ArtSampleDocs xmlns="4873beb7-5857-4685-be1f-d57550cc96cc" xsi:nil="true"/>
-    <UALocRecommendation xmlns="4873beb7-5857-4685-be1f-d57550cc96cc">Localize</UALocRecommendation>
-    <Manager xmlns="4873beb7-5857-4685-be1f-d57550cc96cc" xsi:nil="true"/>
-    <ShowIn xmlns="4873beb7-5857-4685-be1f-d57550cc96cc">Show everywhere</ShowIn>
-    <UANotes xmlns="4873beb7-5857-4685-be1f-d57550cc96cc" xsi:nil="true"/>
-    <TemplateStatus xmlns="4873beb7-5857-4685-be1f-d57550cc96cc">Complete</TemplateStatus>
-    <InternalTagsTaxHTField0 xmlns="4873beb7-5857-4685-be1f-d57550cc96cc">
-      <Terms xmlns="http://schemas.microsoft.com/office/infopath/2007/PartnerControls"/>
-    </InternalTagsTaxHTField0>
-    <CSXHash xmlns="4873beb7-5857-4685-be1f-d57550cc96cc" xsi:nil="true"/>
-    <Downloads xmlns="4873beb7-5857-4685-be1f-d57550cc96cc">0</Downloads>
-    <VoteCount xmlns="4873beb7-5857-4685-be1f-d57550cc96cc" xsi:nil="true"/>
-    <OOCacheId xmlns="4873beb7-5857-4685-be1f-d57550cc96cc" xsi:nil="true"/>
-    <IsDeleted xmlns="4873beb7-5857-4685-be1f-d57550cc96cc">false</IsDeleted>
-    <AssetExpire xmlns="4873beb7-5857-4685-be1f-d57550cc96cc">2029-01-01T08:00:00+00:00</AssetExpire>
-    <DSATActionTaken xmlns="4873beb7-5857-4685-be1f-d57550cc96cc" xsi:nil="true"/>
-    <CSXSubmissionMarket xmlns="4873beb7-5857-4685-be1f-d57550cc96cc" xsi:nil="true"/>
-    <TPExecutable xmlns="4873beb7-5857-4685-be1f-d57550cc96cc" xsi:nil="true"/>
-    <SubmitterId xmlns="4873beb7-5857-4685-be1f-d57550cc96cc" xsi:nil="true"/>
-    <EditorialTags xmlns="4873beb7-5857-4685-be1f-d57550cc96cc" xsi:nil="true"/>
-    <ApprovalLog xmlns="4873beb7-5857-4685-be1f-d57550cc96cc" xsi:nil="true"/>
-    <AssetType xmlns="4873beb7-5857-4685-be1f-d57550cc96cc">TP</AssetType>
-    <BugNumber xmlns="4873beb7-5857-4685-be1f-d57550cc96cc" xsi:nil="true"/>
-    <CSXSubmissionDate xmlns="4873beb7-5857-4685-be1f-d57550cc96cc" xsi:nil="true"/>
-    <CSXUpdate xmlns="4873beb7-5857-4685-be1f-d57550cc96cc">false</CSXUpdate>
-    <Milestone xmlns="4873beb7-5857-4685-be1f-d57550cc96cc" xsi:nil="true"/>
-    <RecommendationsModifier xmlns="4873beb7-5857-4685-be1f-d57550cc96cc" xsi:nil="true"/>
-    <OriginAsset xmlns="4873beb7-5857-4685-be1f-d57550cc96cc" xsi:nil="true"/>
-    <TPComponent xmlns="4873beb7-5857-4685-be1f-d57550cc96cc" xsi:nil="true"/>
-    <AssetId xmlns="4873beb7-5857-4685-be1f-d57550cc96cc">TP102895246</AssetId>
-    <IntlLocPriority xmlns="4873beb7-5857-4685-be1f-d57550cc96cc" xsi:nil="true"/>
-    <PolicheckWords xmlns="4873beb7-5857-4685-be1f-d57550cc96cc" xsi:nil="true"/>
-    <TPLaunchHelpLink xmlns="4873beb7-5857-4685-be1f-d57550cc96cc" xsi:nil="true"/>
-    <TPApplication xmlns="4873beb7-5857-4685-be1f-d57550cc96cc" xsi:nil="true"/>
-    <CrawlForDependencies xmlns="4873beb7-5857-4685-be1f-d57550cc96cc">false</CrawlForDependencies>
-    <HandoffToMSDN xmlns="4873beb7-5857-4685-be1f-d57550cc96cc" xsi:nil="true"/>
-    <PlannedPubDate xmlns="4873beb7-5857-4685-be1f-d57550cc96cc" xsi:nil="true"/>
-    <IntlLangReviewer xmlns="4873beb7-5857-4685-be1f-d57550cc96cc" xsi:nil="true"/>
-    <TrustLevel xmlns="4873beb7-5857-4685-be1f-d57550cc96cc">1 Microsoft Managed Content</TrustLevel>
-    <LocLastLocAttemptVersionLookup xmlns="4873beb7-5857-4685-be1f-d57550cc96cc">835483</LocLastLocAttemptVersionLookup>
-    <IsSearchable xmlns="4873beb7-5857-4685-be1f-d57550cc96cc">true</IsSearchable>
-    <TemplateTemplateType xmlns="4873beb7-5857-4685-be1f-d57550cc96cc">PowerPoint Presentation Template</TemplateTemplateType>
-    <CampaignTagsTaxHTField0 xmlns="4873beb7-5857-4685-be1f-d57550cc96cc">
-      <Terms xmlns="http://schemas.microsoft.com/office/infopath/2007/PartnerControls"/>
-    </CampaignTagsTaxHTField0>
-    <TPNamespace xmlns="4873beb7-5857-4685-be1f-d57550cc96cc" xsi:nil="true"/>
-    <TaxCatchAll xmlns="4873beb7-5857-4685-be1f-d57550cc96cc"/>
-    <Markets xmlns="4873beb7-5857-4685-be1f-d57550cc96cc"/>
-    <UAProjectedTotalWords xmlns="4873beb7-5857-4685-be1f-d57550cc96cc" xsi:nil="true"/>
-    <IntlLangReview xmlns="4873beb7-5857-4685-be1f-d57550cc96cc">false</IntlLangReview>
-    <OutputCachingOn xmlns="4873beb7-5857-4685-be1f-d57550cc96cc">false</OutputCachingOn>
-    <AverageRating xmlns="4873beb7-5857-4685-be1f-d57550cc96cc" xsi:nil="true"/>
-    <APAuthor xmlns="4873beb7-5857-4685-be1f-d57550cc96cc">
-      <UserInfo>
-        <DisplayName>REDMOND\v-vaddu</DisplayName>
-        <AccountId>2567</AccountId>
-        <AccountType/>
-      </UserInfo>
-    </APAuthor>
-    <LocManualTestRequired xmlns="4873beb7-5857-4685-be1f-d57550cc96cc">false</LocManualTestRequired>
-    <TPCommandLine xmlns="4873beb7-5857-4685-be1f-d57550cc96cc" xsi:nil="true"/>
-    <TPAppVersion xmlns="4873beb7-5857-4685-be1f-d57550cc96cc" xsi:nil="true"/>
-    <EditorialStatus xmlns="4873beb7-5857-4685-be1f-d57550cc96cc">Complete</EditorialStatus>
-    <LastModifiedDateTime xmlns="4873beb7-5857-4685-be1f-d57550cc96cc" xsi:nil="true"/>
-    <ScenarioTagsTaxHTField0 xmlns="4873beb7-5857-4685-be1f-d57550cc96cc">
-      <Terms xmlns="http://schemas.microsoft.com/office/infopath/2007/PartnerControls"/>
-    </ScenarioTagsTaxHTField0>
-    <OriginalRelease xmlns="4873beb7-5857-4685-be1f-d57550cc96cc">15</OriginalRelease>
-    <TPLaunchHelpLinkType xmlns="4873beb7-5857-4685-be1f-d57550cc96cc">Template</TPLaunchHelpLinkType>
-    <LocalizationTagsTaxHTField0 xmlns="4873beb7-5857-4685-be1f-d57550cc96cc">
-      <Terms xmlns="http://schemas.microsoft.com/office/infopath/2007/PartnerControls"/>
-    </LocalizationTagsTaxHTField0>
-    <LocMarketGroupTiers2 xmlns="4873beb7-5857-4685-be1f-d57550cc96cc" xsi:nil="true"/>
-  </documentManagement>
-</p:properties>
+<file path=customXml/itemProps1.xml><?xml version="1.0" encoding="utf-8"?>
+<ds:datastoreItem xmlns:ds="http://schemas.openxmlformats.org/officeDocument/2006/customXml" ds:itemID="{00E41224-0370-4595-877C-23316CD80004}">
+  <ds:schemaRefs>
+    <ds:schemaRef ds:uri="http://purl.org/dc/terms/"/>
+    <ds:schemaRef ds:uri="http://schemas.openxmlformats.org/package/2006/metadata/core-properties"/>
+    <ds:schemaRef ds:uri="http://purl.org/dc/dcmitype/"/>
+    <ds:schemaRef ds:uri="http://purl.org/dc/elements/1.1/"/>
+    <ds:schemaRef ds:uri="http://schemas.microsoft.com/office/2006/metadata/properties"/>
+    <ds:schemaRef ds:uri="4873beb7-5857-4685-be1f-d57550cc96cc"/>
+    <ds:schemaRef ds:uri="http://schemas.microsoft.com/office/2006/documentManagement/types"/>
+    <ds:schemaRef ds:uri="http://schemas.microsoft.com/office/infopath/2007/PartnerControls"/>
+    <ds:schemaRef ds:uri="http://www.w3.org/XML/1998/namespace"/>
+  </ds:schemaRefs>
+</ds:datastoreItem>
 </file>
 
-<file path=customXml/itemProps1.xml><?xml version="1.0" encoding="utf-8"?>
+<file path=customXml/itemProps2.xml><?xml version="1.0" encoding="utf-8"?>
 <ds:datastoreItem xmlns:ds="http://schemas.openxmlformats.org/officeDocument/2006/customXml" ds:itemID="{22CCB507-0646-4A50-A4F7-7F385079D589}">
   <ds:schemaRefs>
     <ds:schemaRef ds:uri="http://schemas.microsoft.com/office/2006/metadata/contentType"/>
@@ -10870,26 +11424,10 @@
 </ds:datastoreItem>
 </file>
 
-<file path=customXml/itemProps2.xml><?xml version="1.0" encoding="utf-8"?>
+<file path=customXml/itemProps3.xml><?xml version="1.0" encoding="utf-8"?>
 <ds:datastoreItem xmlns:ds="http://schemas.openxmlformats.org/officeDocument/2006/customXml" ds:itemID="{74228E6B-D70C-44BB-A81F-A245495F612B}">
   <ds:schemaRefs>
     <ds:schemaRef ds:uri="http://schemas.microsoft.com/sharepoint/v3/contenttype/forms"/>
   </ds:schemaRefs>
 </ds:datastoreItem>
-</file>
-
-<file path=customXml/itemProps3.xml><?xml version="1.0" encoding="utf-8"?>
-<ds:datastoreItem xmlns:ds="http://schemas.openxmlformats.org/officeDocument/2006/customXml" ds:itemID="{00E41224-0370-4595-877C-23316CD80004}">
-  <ds:schemaRefs>
-    <ds:schemaRef ds:uri="http://purl.org/dc/terms/"/>
-    <ds:schemaRef ds:uri="http://schemas.openxmlformats.org/package/2006/metadata/core-properties"/>
-    <ds:schemaRef ds:uri="http://purl.org/dc/dcmitype/"/>
-    <ds:schemaRef ds:uri="http://purl.org/dc/elements/1.1/"/>
-    <ds:schemaRef ds:uri="http://schemas.microsoft.com/office/2006/metadata/properties"/>
-    <ds:schemaRef ds:uri="4873beb7-5857-4685-be1f-d57550cc96cc"/>
-    <ds:schemaRef ds:uri="http://schemas.microsoft.com/office/2006/documentManagement/types"/>
-    <ds:schemaRef ds:uri="http://schemas.microsoft.com/office/infopath/2007/PartnerControls"/>
-    <ds:schemaRef ds:uri="http://www.w3.org/XML/1998/namespace"/>
-  </ds:schemaRefs>
-</ds:datastoreItem>
 </file>
</xml_diff>